<commit_message>
Add word cloud and update project summary/publications
</commit_message>
<xml_diff>
--- a/CVs/projects.pptx
+++ b/CVs/projects.pptx
@@ -3223,7 +3223,7 @@
           <a:p>
             <a:fld id="{76D2FA39-20D9-7E4E-B5D4-6367AC475652}" type="datetimeFigureOut">
               <a:rPr lang="en-US" smtClean="0"/>
-              <a:t>1/25/19</a:t>
+              <a:t>2/28/19</a:t>
             </a:fld>
             <a:endParaRPr lang="en-US"/>
           </a:p>
@@ -3713,7 +3713,7 @@
           <a:p>
             <a:fld id="{42641464-A197-844D-87E0-913B468005BB}" type="datetimeFigureOut">
               <a:rPr lang="en-US" smtClean="0"/>
-              <a:t>1/25/19</a:t>
+              <a:t>2/28/19</a:t>
             </a:fld>
             <a:endParaRPr lang="en-US"/>
           </a:p>
@@ -3883,7 +3883,7 @@
           <a:p>
             <a:fld id="{42641464-A197-844D-87E0-913B468005BB}" type="datetimeFigureOut">
               <a:rPr lang="en-US" smtClean="0"/>
-              <a:t>1/25/19</a:t>
+              <a:t>2/28/19</a:t>
             </a:fld>
             <a:endParaRPr lang="en-US"/>
           </a:p>
@@ -4063,7 +4063,7 @@
           <a:p>
             <a:fld id="{42641464-A197-844D-87E0-913B468005BB}" type="datetimeFigureOut">
               <a:rPr lang="en-US" smtClean="0"/>
-              <a:t>1/25/19</a:t>
+              <a:t>2/28/19</a:t>
             </a:fld>
             <a:endParaRPr lang="en-US"/>
           </a:p>
@@ -4233,7 +4233,7 @@
           <a:p>
             <a:fld id="{42641464-A197-844D-87E0-913B468005BB}" type="datetimeFigureOut">
               <a:rPr lang="en-US" smtClean="0"/>
-              <a:t>1/25/19</a:t>
+              <a:t>2/28/19</a:t>
             </a:fld>
             <a:endParaRPr lang="en-US"/>
           </a:p>
@@ -4477,7 +4477,7 @@
           <a:p>
             <a:fld id="{42641464-A197-844D-87E0-913B468005BB}" type="datetimeFigureOut">
               <a:rPr lang="en-US" smtClean="0"/>
-              <a:t>1/25/19</a:t>
+              <a:t>2/28/19</a:t>
             </a:fld>
             <a:endParaRPr lang="en-US"/>
           </a:p>
@@ -4709,7 +4709,7 @@
           <a:p>
             <a:fld id="{42641464-A197-844D-87E0-913B468005BB}" type="datetimeFigureOut">
               <a:rPr lang="en-US" smtClean="0"/>
-              <a:t>1/25/19</a:t>
+              <a:t>2/28/19</a:t>
             </a:fld>
             <a:endParaRPr lang="en-US"/>
           </a:p>
@@ -5076,7 +5076,7 @@
           <a:p>
             <a:fld id="{42641464-A197-844D-87E0-913B468005BB}" type="datetimeFigureOut">
               <a:rPr lang="en-US" smtClean="0"/>
-              <a:t>1/25/19</a:t>
+              <a:t>2/28/19</a:t>
             </a:fld>
             <a:endParaRPr lang="en-US"/>
           </a:p>
@@ -5194,7 +5194,7 @@
           <a:p>
             <a:fld id="{42641464-A197-844D-87E0-913B468005BB}" type="datetimeFigureOut">
               <a:rPr lang="en-US" smtClean="0"/>
-              <a:t>1/25/19</a:t>
+              <a:t>2/28/19</a:t>
             </a:fld>
             <a:endParaRPr lang="en-US"/>
           </a:p>
@@ -5289,7 +5289,7 @@
           <a:p>
             <a:fld id="{42641464-A197-844D-87E0-913B468005BB}" type="datetimeFigureOut">
               <a:rPr lang="en-US" smtClean="0"/>
-              <a:t>1/25/19</a:t>
+              <a:t>2/28/19</a:t>
             </a:fld>
             <a:endParaRPr lang="en-US"/>
           </a:p>
@@ -5566,7 +5566,7 @@
           <a:p>
             <a:fld id="{42641464-A197-844D-87E0-913B468005BB}" type="datetimeFigureOut">
               <a:rPr lang="en-US" smtClean="0"/>
-              <a:t>1/25/19</a:t>
+              <a:t>2/28/19</a:t>
             </a:fld>
             <a:endParaRPr lang="en-US"/>
           </a:p>
@@ -5823,7 +5823,7 @@
           <a:p>
             <a:fld id="{42641464-A197-844D-87E0-913B468005BB}" type="datetimeFigureOut">
               <a:rPr lang="en-US" smtClean="0"/>
-              <a:t>1/25/19</a:t>
+              <a:t>2/28/19</a:t>
             </a:fld>
             <a:endParaRPr lang="en-US"/>
           </a:p>
@@ -6036,7 +6036,7 @@
           <a:p>
             <a:fld id="{42641464-A197-844D-87E0-913B468005BB}" type="datetimeFigureOut">
               <a:rPr lang="en-US" smtClean="0"/>
-              <a:t>1/25/19</a:t>
+              <a:t>2/28/19</a:t>
             </a:fld>
             <a:endParaRPr lang="en-US"/>
           </a:p>
@@ -6770,8 +6770,8 @@
         </p:nvSpPr>
         <p:spPr>
           <a:xfrm>
-            <a:off x="7187796" y="2018927"/>
-            <a:ext cx="3139505" cy="1000787"/>
+            <a:off x="7416810" y="2219225"/>
+            <a:ext cx="3139505" cy="546560"/>
           </a:xfrm>
           <a:prstGeom prst="rect">
             <a:avLst/>
@@ -6787,28 +6787,14 @@
             <a:pPr lvl="1"/>
             <a:r>
               <a:rPr lang="en-US" sz="1476" dirty="0"/>
-              <a:t>﻿LOOCV-RMSE using</a:t>
+              <a:t>﻿10-fold cross-validation</a:t>
             </a:r>
           </a:p>
           <a:p>
             <a:pPr lvl="1"/>
             <a:r>
               <a:rPr lang="en-US" sz="1476" dirty="0"/>
-              <a:t>  KRR = 0.51 eV (Magpie)</a:t>
-            </a:r>
-          </a:p>
-          <a:p>
-            <a:pPr lvl="1"/>
-            <a:r>
-              <a:rPr lang="en-US" sz="1476" dirty="0"/>
-              <a:t>  LASSO = 0.71 eV (Magpie)</a:t>
-            </a:r>
-          </a:p>
-          <a:p>
-            <a:pPr lvl="1"/>
-            <a:r>
-              <a:rPr lang="en-US" sz="1476" dirty="0"/>
-              <a:t>  KRR = 0.34 (w/  MP_PBE)</a:t>
+              <a:t> Both RMSE &amp; MAE</a:t>
             </a:r>
           </a:p>
         </p:txBody>
@@ -6826,13 +6812,13 @@
           <p:nvPr>
             <p:extLst>
               <p:ext uri="{D42A27DB-BD31-4B8C-83A1-F6EECF244321}">
-                <p14:modId xmlns:p14="http://schemas.microsoft.com/office/powerpoint/2010/main" val="2348764528"/>
+                <p14:modId xmlns:p14="http://schemas.microsoft.com/office/powerpoint/2010/main" val="3191107230"/>
               </p:ext>
             </p:extLst>
           </p:nvPr>
         </p:nvGraphicFramePr>
         <p:xfrm>
-          <a:off x="285731" y="55900"/>
+          <a:off x="285731" y="212349"/>
           <a:ext cx="9579524" cy="2986690"/>
         </p:xfrm>
         <a:graphic>
@@ -6855,48 +6841,8 @@
         </p:nvSpPr>
         <p:spPr>
           <a:xfrm>
-            <a:off x="345226" y="2246079"/>
-            <a:ext cx="4999038" cy="546560"/>
-          </a:xfrm>
-          <a:prstGeom prst="rect">
-            <a:avLst/>
-          </a:prstGeom>
-        </p:spPr>
-        <p:txBody>
-          <a:bodyPr>
-            <a:spAutoFit/>
-          </a:bodyPr>
-          <a:lstStyle/>
-          <a:p>
-            <a:r>
-              <a:rPr lang="en-US" sz="1476" dirty="0"/>
-              <a:t>Magpie Features</a:t>
-            </a:r>
-          </a:p>
-          <a:p>
-            <a:r>
-              <a:rPr lang="en-US" sz="1476" dirty="0"/>
-              <a:t>PBE bandgaps</a:t>
-            </a:r>
-          </a:p>
-        </p:txBody>
-      </p:sp>
-      <p:sp>
-        <p:nvSpPr>
-          <p:cNvPr id="7" name="Rectangle 6">
-            <a:extLst>
-              <a:ext uri="{FF2B5EF4-FFF2-40B4-BE49-F238E27FC236}">
-                <a16:creationId xmlns:a16="http://schemas.microsoft.com/office/drawing/2014/main" id="{C82C7ED8-29F8-8549-8102-BE2EE03835B0}"/>
-              </a:ext>
-            </a:extLst>
-          </p:cNvPr>
-          <p:cNvSpPr/>
-          <p:nvPr/>
-        </p:nvSpPr>
-        <p:spPr>
-          <a:xfrm>
-            <a:off x="1985203" y="2198927"/>
-            <a:ext cx="1719084" cy="546560"/>
+            <a:off x="345225" y="2212211"/>
+            <a:ext cx="1878685" cy="773673"/>
           </a:xfrm>
           <a:prstGeom prst="rect">
             <a:avLst/>
@@ -6908,27 +6854,19 @@
           </a:bodyPr>
           <a:lstStyle/>
           <a:p>
-            <a:pPr lvl="1"/>
-            <a:r>
-              <a:rPr lang="en-US" sz="1476"/>
-              <a:t>Experimental </a:t>
-            </a:r>
-          </a:p>
-          <a:p>
-            <a:pPr lvl="1"/>
             <a:r>
               <a:rPr lang="en-US" sz="1476" dirty="0"/>
-              <a:t>bandgaps </a:t>
+              <a:t>Generalized elemental properties (Magpie) </a:t>
             </a:r>
           </a:p>
         </p:txBody>
       </p:sp>
       <p:sp>
         <p:nvSpPr>
-          <p:cNvPr id="8" name="Rectangle 7">
+          <p:cNvPr id="7" name="Rectangle 6">
             <a:extLst>
               <a:ext uri="{FF2B5EF4-FFF2-40B4-BE49-F238E27FC236}">
-                <a16:creationId xmlns:a16="http://schemas.microsoft.com/office/drawing/2014/main" id="{672F9247-3FE0-994D-9DDD-06F5223A9A3B}"/>
+                <a16:creationId xmlns:a16="http://schemas.microsoft.com/office/drawing/2014/main" id="{C82C7ED8-29F8-8549-8102-BE2EE03835B0}"/>
               </a:ext>
             </a:extLst>
           </p:cNvPr>
@@ -6937,54 +6875,8 @@
         </p:nvSpPr>
         <p:spPr>
           <a:xfrm>
-            <a:off x="3704287" y="2198927"/>
-            <a:ext cx="2301079" cy="546560"/>
-          </a:xfrm>
-          <a:prstGeom prst="rect">
-            <a:avLst/>
-          </a:prstGeom>
-        </p:spPr>
-        <p:txBody>
-          <a:bodyPr wrap="none">
-            <a:spAutoFit/>
-          </a:bodyPr>
-          <a:lstStyle/>
-          <a:p>
-            <a:pPr lvl="1"/>
-            <a:r>
-              <a:rPr lang="en-US" sz="1476" dirty="0" err="1"/>
-              <a:t>Exp</a:t>
-            </a:r>
-            <a:r>
-              <a:rPr lang="en-US" sz="1476" dirty="0"/>
-              <a:t> from two sources</a:t>
-            </a:r>
-          </a:p>
-          <a:p>
-            <a:pPr lvl="1"/>
-            <a:r>
-              <a:rPr lang="en-US" sz="1476" dirty="0"/>
-              <a:t>PBE from MP</a:t>
-            </a:r>
-          </a:p>
-        </p:txBody>
-      </p:sp>
-      <p:sp>
-        <p:nvSpPr>
-          <p:cNvPr id="9" name="Rectangle 8">
-            <a:extLst>
-              <a:ext uri="{FF2B5EF4-FFF2-40B4-BE49-F238E27FC236}">
-                <a16:creationId xmlns:a16="http://schemas.microsoft.com/office/drawing/2014/main" id="{9A551A74-79DE-0444-87B1-91D065199034}"/>
-              </a:ext>
-            </a:extLst>
-          </p:cNvPr>
-          <p:cNvSpPr/>
-          <p:nvPr/>
-        </p:nvSpPr>
-        <p:spPr>
-          <a:xfrm>
-            <a:off x="6000608" y="2246080"/>
-            <a:ext cx="1609642" cy="546560"/>
+            <a:off x="1853921" y="2195239"/>
+            <a:ext cx="2199802" cy="773673"/>
           </a:xfrm>
           <a:prstGeom prst="rect">
             <a:avLst/>
@@ -6999,14 +6891,98 @@
             <a:pPr lvl="1"/>
             <a:r>
               <a:rPr lang="en-US" sz="1476" dirty="0"/>
-              <a:t>KRR </a:t>
+              <a:t>Experiment data</a:t>
             </a:r>
           </a:p>
           <a:p>
             <a:pPr lvl="1"/>
             <a:r>
               <a:rPr lang="en-US" sz="1476" dirty="0"/>
-              <a:t>LASSO </a:t>
+              <a:t>&amp; High-fidelity computational data</a:t>
+            </a:r>
+          </a:p>
+        </p:txBody>
+      </p:sp>
+      <p:sp>
+        <p:nvSpPr>
+          <p:cNvPr id="8" name="Rectangle 7">
+            <a:extLst>
+              <a:ext uri="{FF2B5EF4-FFF2-40B4-BE49-F238E27FC236}">
+                <a16:creationId xmlns:a16="http://schemas.microsoft.com/office/drawing/2014/main" id="{672F9247-3FE0-994D-9DDD-06F5223A9A3B}"/>
+              </a:ext>
+            </a:extLst>
+          </p:cNvPr>
+          <p:cNvSpPr/>
+          <p:nvPr/>
+        </p:nvSpPr>
+        <p:spPr>
+          <a:xfrm>
+            <a:off x="3678449" y="2222503"/>
+            <a:ext cx="2199802" cy="773673"/>
+          </a:xfrm>
+          <a:prstGeom prst="rect">
+            <a:avLst/>
+          </a:prstGeom>
+        </p:spPr>
+        <p:txBody>
+          <a:bodyPr wrap="square">
+            <a:spAutoFit/>
+          </a:bodyPr>
+          <a:lstStyle/>
+          <a:p>
+            <a:pPr lvl="1"/>
+            <a:r>
+              <a:rPr lang="en-US" sz="1476" dirty="0"/>
+              <a:t>Materials properties data stored in OQMD (low-fidelity)</a:t>
+            </a:r>
+          </a:p>
+        </p:txBody>
+      </p:sp>
+      <p:sp>
+        <p:nvSpPr>
+          <p:cNvPr id="9" name="Rectangle 8">
+            <a:extLst>
+              <a:ext uri="{FF2B5EF4-FFF2-40B4-BE49-F238E27FC236}">
+                <a16:creationId xmlns:a16="http://schemas.microsoft.com/office/drawing/2014/main" id="{9A551A74-79DE-0444-87B1-91D065199034}"/>
+              </a:ext>
+            </a:extLst>
+          </p:cNvPr>
+          <p:cNvSpPr/>
+          <p:nvPr/>
+        </p:nvSpPr>
+        <p:spPr>
+          <a:xfrm>
+            <a:off x="5903774" y="2222834"/>
+            <a:ext cx="1924192" cy="773673"/>
+          </a:xfrm>
+          <a:prstGeom prst="rect">
+            <a:avLst/>
+          </a:prstGeom>
+        </p:spPr>
+        <p:txBody>
+          <a:bodyPr wrap="square">
+            <a:spAutoFit/>
+          </a:bodyPr>
+          <a:lstStyle/>
+          <a:p>
+            <a:pPr lvl="1"/>
+            <a:r>
+              <a:rPr lang="en-US" sz="1476" dirty="0"/>
+              <a:t>LASSO</a:t>
+            </a:r>
+          </a:p>
+          <a:p>
+            <a:pPr lvl="1"/>
+            <a:r>
+              <a:rPr lang="en-US" sz="1476" dirty="0"/>
+              <a:t>SVM</a:t>
+            </a:r>
+          </a:p>
+          <a:p>
+            <a:pPr lvl="1"/>
+            <a:r>
+              <a:rPr lang="en-US" sz="1476" dirty="0"/>
+              <a:t>Random Forest </a:t>
             </a:r>
           </a:p>
         </p:txBody>
@@ -7039,7 +7015,7 @@
         </p:blipFill>
         <p:spPr>
           <a:xfrm>
-            <a:off x="450699" y="3169455"/>
+            <a:off x="474295" y="3863969"/>
             <a:ext cx="2759251" cy="2759251"/>
           </a:xfrm>
           <a:prstGeom prst="rect">
@@ -7075,7 +7051,7 @@
         </p:blipFill>
         <p:spPr>
           <a:xfrm>
-            <a:off x="3510899" y="3169456"/>
+            <a:off x="3851693" y="3910338"/>
             <a:ext cx="2774248" cy="2774248"/>
           </a:xfrm>
           <a:prstGeom prst="rect">
@@ -7097,7 +7073,7 @@
           </p:cNvPicPr>
           <p:nvPr/>
         </p:nvPicPr>
-        <p:blipFill>
+        <p:blipFill rotWithShape="1">
           <a:blip r:embed="rId9">
             <a:extLst>
               <a:ext uri="{28A0092B-C50C-407E-A947-70E740481C1C}">
@@ -7105,20 +7081,254 @@
               </a:ext>
             </a:extLst>
           </a:blip>
-          <a:stretch>
-            <a:fillRect/>
-          </a:stretch>
+          <a:srcRect l="16211" r="5760"/>
+          <a:stretch/>
         </p:blipFill>
         <p:spPr>
           <a:xfrm>
-            <a:off x="6309849" y="3446276"/>
-            <a:ext cx="3555406" cy="2370270"/>
+            <a:off x="6863643" y="4091615"/>
+            <a:ext cx="2774249" cy="2370270"/>
           </a:xfrm>
           <a:prstGeom prst="rect">
             <a:avLst/>
           </a:prstGeom>
         </p:spPr>
       </p:pic>
+      <p:sp>
+        <p:nvSpPr>
+          <p:cNvPr id="13" name="Rectangle 12">
+            <a:extLst>
+              <a:ext uri="{FF2B5EF4-FFF2-40B4-BE49-F238E27FC236}">
+                <a16:creationId xmlns:a16="http://schemas.microsoft.com/office/drawing/2014/main" id="{59133712-B22D-514A-8D38-320A1E78BF68}"/>
+              </a:ext>
+            </a:extLst>
+          </p:cNvPr>
+          <p:cNvSpPr/>
+          <p:nvPr/>
+        </p:nvSpPr>
+        <p:spPr>
+          <a:xfrm>
+            <a:off x="1084511" y="223032"/>
+            <a:ext cx="7981964" cy="814382"/>
+          </a:xfrm>
+          <a:prstGeom prst="rect">
+            <a:avLst/>
+          </a:prstGeom>
+          <a:noFill/>
+          <a:effectLst>
+            <a:outerShdw blurRad="50800" dist="38100" dir="2700000" algn="tl" rotWithShape="0">
+              <a:prstClr val="black">
+                <a:alpha val="40000"/>
+              </a:prstClr>
+            </a:outerShdw>
+          </a:effectLst>
+        </p:spPr>
+        <p:txBody>
+          <a:bodyPr wrap="square" lIns="74986" tIns="37493" rIns="74986" bIns="37493">
+            <a:spAutoFit/>
+          </a:bodyPr>
+          <a:lstStyle/>
+          <a:p>
+            <a:pPr algn="ctr"/>
+            <a:r>
+              <a:rPr lang="en-US" sz="4800" b="1" dirty="0">
+                <a:ln w="9525">
+                  <a:solidFill>
+                    <a:schemeClr val="bg1"/>
+                  </a:solidFill>
+                  <a:prstDash val="solid"/>
+                </a:ln>
+                <a:effectLst>
+                  <a:outerShdw blurRad="12700" dist="38100" dir="2700000" algn="tl" rotWithShape="0">
+                    <a:schemeClr val="bg1">
+                      <a:lumMod val="50000"/>
+                    </a:schemeClr>
+                  </a:outerShdw>
+                </a:effectLst>
+              </a:rPr>
+              <a:t>Workflow of ML on Materials</a:t>
+            </a:r>
+          </a:p>
+        </p:txBody>
+      </p:sp>
+      <p:sp>
+        <p:nvSpPr>
+          <p:cNvPr id="2" name="TextBox 1">
+            <a:extLst>
+              <a:ext uri="{FF2B5EF4-FFF2-40B4-BE49-F238E27FC236}">
+                <a16:creationId xmlns:a16="http://schemas.microsoft.com/office/drawing/2014/main" id="{FCC75553-632B-8D49-A212-18A2FE645E11}"/>
+              </a:ext>
+            </a:extLst>
+          </p:cNvPr>
+          <p:cNvSpPr txBox="1"/>
+          <p:nvPr/>
+        </p:nvSpPr>
+        <p:spPr>
+          <a:xfrm>
+            <a:off x="587185" y="3271204"/>
+            <a:ext cx="2885758" cy="646331"/>
+          </a:xfrm>
+          <a:prstGeom prst="rect">
+            <a:avLst/>
+          </a:prstGeom>
+          <a:noFill/>
+        </p:spPr>
+        <p:txBody>
+          <a:bodyPr wrap="square" rtlCol="0">
+            <a:spAutoFit/>
+          </a:bodyPr>
+          <a:lstStyle/>
+          <a:p>
+            <a:r>
+              <a:rPr lang="en-US" dirty="0"/>
+              <a:t>Regression Model on high-fidelity data prediction </a:t>
+            </a:r>
+          </a:p>
+        </p:txBody>
+      </p:sp>
+      <p:sp>
+        <p:nvSpPr>
+          <p:cNvPr id="14" name="TextBox 13">
+            <a:extLst>
+              <a:ext uri="{FF2B5EF4-FFF2-40B4-BE49-F238E27FC236}">
+                <a16:creationId xmlns:a16="http://schemas.microsoft.com/office/drawing/2014/main" id="{45AFA47A-D41C-7E43-B33B-E321B7B328B6}"/>
+              </a:ext>
+            </a:extLst>
+          </p:cNvPr>
+          <p:cNvSpPr txBox="1"/>
+          <p:nvPr/>
+        </p:nvSpPr>
+        <p:spPr>
+          <a:xfrm>
+            <a:off x="5048386" y="3271203"/>
+            <a:ext cx="4185923" cy="646331"/>
+          </a:xfrm>
+          <a:prstGeom prst="rect">
+            <a:avLst/>
+          </a:prstGeom>
+          <a:noFill/>
+        </p:spPr>
+        <p:txBody>
+          <a:bodyPr wrap="square" rtlCol="0">
+            <a:spAutoFit/>
+          </a:bodyPr>
+          <a:lstStyle/>
+          <a:p>
+            <a:r>
+              <a:rPr lang="en-US" dirty="0"/>
+              <a:t>Classification Model on whether high-fidelity calculation is needed</a:t>
+            </a:r>
+          </a:p>
+        </p:txBody>
+      </p:sp>
+      <p:sp>
+        <p:nvSpPr>
+          <p:cNvPr id="3" name="Rounded Rectangle 2">
+            <a:extLst>
+              <a:ext uri="{FF2B5EF4-FFF2-40B4-BE49-F238E27FC236}">
+                <a16:creationId xmlns:a16="http://schemas.microsoft.com/office/drawing/2014/main" id="{D7EAA649-DB64-2542-BA80-410AFDD263EC}"/>
+              </a:ext>
+            </a:extLst>
+          </p:cNvPr>
+          <p:cNvSpPr/>
+          <p:nvPr/>
+        </p:nvSpPr>
+        <p:spPr>
+          <a:xfrm>
+            <a:off x="345225" y="3271203"/>
+            <a:ext cx="3333224" cy="3413383"/>
+          </a:xfrm>
+          <a:prstGeom prst="roundRect">
+            <a:avLst>
+              <a:gd name="adj" fmla="val 5491"/>
+            </a:avLst>
+          </a:prstGeom>
+          <a:noFill/>
+          <a:ln w="28575">
+            <a:solidFill>
+              <a:schemeClr val="accent6"/>
+            </a:solidFill>
+          </a:ln>
+        </p:spPr>
+        <p:style>
+          <a:lnRef idx="2">
+            <a:schemeClr val="accent1">
+              <a:shade val="50000"/>
+            </a:schemeClr>
+          </a:lnRef>
+          <a:fillRef idx="1">
+            <a:schemeClr val="accent1"/>
+          </a:fillRef>
+          <a:effectRef idx="0">
+            <a:schemeClr val="accent1"/>
+          </a:effectRef>
+          <a:fontRef idx="minor">
+            <a:schemeClr val="lt1"/>
+          </a:fontRef>
+        </p:style>
+        <p:txBody>
+          <a:bodyPr rtlCol="0" anchor="ctr"/>
+          <a:lstStyle/>
+          <a:p>
+            <a:pPr algn="ctr"/>
+            <a:endParaRPr lang="en-US" dirty="0"/>
+          </a:p>
+        </p:txBody>
+      </p:sp>
+      <p:sp>
+        <p:nvSpPr>
+          <p:cNvPr id="15" name="Rounded Rectangle 14">
+            <a:extLst>
+              <a:ext uri="{FF2B5EF4-FFF2-40B4-BE49-F238E27FC236}">
+                <a16:creationId xmlns:a16="http://schemas.microsoft.com/office/drawing/2014/main" id="{518141B0-D44C-D844-9AFC-74C2F5293D27}"/>
+              </a:ext>
+            </a:extLst>
+          </p:cNvPr>
+          <p:cNvSpPr/>
+          <p:nvPr/>
+        </p:nvSpPr>
+        <p:spPr>
+          <a:xfrm>
+            <a:off x="3959834" y="3271203"/>
+            <a:ext cx="5693016" cy="3413383"/>
+          </a:xfrm>
+          <a:prstGeom prst="roundRect">
+            <a:avLst>
+              <a:gd name="adj" fmla="val 5491"/>
+            </a:avLst>
+          </a:prstGeom>
+          <a:noFill/>
+          <a:ln w="28575">
+            <a:solidFill>
+              <a:schemeClr val="accent6"/>
+            </a:solidFill>
+          </a:ln>
+        </p:spPr>
+        <p:style>
+          <a:lnRef idx="2">
+            <a:schemeClr val="accent1">
+              <a:shade val="50000"/>
+            </a:schemeClr>
+          </a:lnRef>
+          <a:fillRef idx="1">
+            <a:schemeClr val="accent1"/>
+          </a:fillRef>
+          <a:effectRef idx="0">
+            <a:schemeClr val="accent1"/>
+          </a:effectRef>
+          <a:fontRef idx="minor">
+            <a:schemeClr val="lt1"/>
+          </a:fontRef>
+        </p:style>
+        <p:txBody>
+          <a:bodyPr rtlCol="0" anchor="ctr"/>
+          <a:lstStyle/>
+          <a:p>
+            <a:pPr algn="ctr"/>
+            <a:endParaRPr lang="en-US" dirty="0"/>
+          </a:p>
+        </p:txBody>
+      </p:sp>
     </p:spTree>
     <p:extLst>
       <p:ext uri="{BB962C8B-B14F-4D97-AF65-F5344CB8AC3E}">

</xml_diff>